<commit_message>
Add f1 score. Fix bugs.
</commit_message>
<xml_diff>
--- a/Simple introduction.pptx
+++ b/Simple introduction.pptx
@@ -225,7 +225,7 @@
           <a:p>
             <a:fld id="{0F9B84EA-7D68-4D60-9CB1-D50884785D1C}" type="datetimeFigureOut">
               <a:rPr lang="zh-CN" altLang="en-US" smtClean="0"/>
-              <a:t>2024/10/24</a:t>
+              <a:t>2025/2/24</a:t>
             </a:fld>
             <a:endParaRPr lang="zh-CN" altLang="en-US"/>
           </a:p>
@@ -390,7 +390,7 @@
           <a:p>
             <a:fld id="{D2A48B96-639E-45A3-A0BA-2464DFDB1FAA}" type="datetimeFigureOut">
               <a:rPr lang="zh-CN" altLang="en-US" smtClean="0"/>
-              <a:t>2024/10/24</a:t>
+              <a:t>2025/2/24</a:t>
             </a:fld>
             <a:endParaRPr lang="zh-CN" altLang="en-US"/>
           </a:p>
@@ -2041,7 +2041,7 @@
           <a:p>
             <a:fld id="{82F288E0-7875-42C4-84C8-98DBBD3BF4D2}" type="datetimeFigureOut">
               <a:rPr lang="zh-CN" altLang="en-US" smtClean="0"/>
-              <a:t>2024/10/24</a:t>
+              <a:t>2025/2/24</a:t>
             </a:fld>
             <a:endParaRPr lang="zh-CN" altLang="en-US"/>
           </a:p>
@@ -2195,7 +2195,7 @@
           <a:p>
             <a:fld id="{82F288E0-7875-42C4-84C8-98DBBD3BF4D2}" type="datetimeFigureOut">
               <a:rPr lang="zh-CN" altLang="en-US" smtClean="0"/>
-              <a:t>2024/10/24</a:t>
+              <a:t>2025/2/24</a:t>
             </a:fld>
             <a:endParaRPr lang="zh-CN" altLang="en-US"/>
           </a:p>
@@ -2329,7 +2329,7 @@
           <a:p>
             <a:fld id="{80F42DC0-2E3F-F440-A3AA-64F0AA1F84F2}" type="datetime1">
               <a:rPr lang="zh-CN" altLang="en-US"/>
-              <a:t>2024/10/24</a:t>
+              <a:t>2025/2/24</a:t>
             </a:fld>
             <a:endParaRPr lang="zh-CN" altLang="en-US" sz="1400">
               <a:solidFill>
@@ -2650,7 +2650,7 @@
           <a:p>
             <a:fld id="{82F288E0-7875-42C4-84C8-98DBBD3BF4D2}" type="datetimeFigureOut">
               <a:rPr lang="zh-CN" altLang="en-US" smtClean="0"/>
-              <a:t>2024/10/24</a:t>
+              <a:t>2025/2/24</a:t>
             </a:fld>
             <a:endParaRPr lang="zh-CN" altLang="en-US"/>
           </a:p>
@@ -2882,7 +2882,7 @@
           <a:p>
             <a:fld id="{82F288E0-7875-42C4-84C8-98DBBD3BF4D2}" type="datetimeFigureOut">
               <a:rPr lang="zh-CN" altLang="en-US" smtClean="0"/>
-              <a:t>2024/10/24</a:t>
+              <a:t>2025/2/24</a:t>
             </a:fld>
             <a:endParaRPr lang="zh-CN" altLang="en-US"/>
           </a:p>
@@ -3249,7 +3249,7 @@
           <a:p>
             <a:fld id="{82F288E0-7875-42C4-84C8-98DBBD3BF4D2}" type="datetimeFigureOut">
               <a:rPr lang="zh-CN" altLang="en-US" smtClean="0"/>
-              <a:t>2024/10/24</a:t>
+              <a:t>2025/2/24</a:t>
             </a:fld>
             <a:endParaRPr lang="zh-CN" altLang="en-US"/>
           </a:p>
@@ -3369,7 +3369,7 @@
           <a:p>
             <a:fld id="{82F288E0-7875-42C4-84C8-98DBBD3BF4D2}" type="datetimeFigureOut">
               <a:rPr lang="zh-CN" altLang="en-US" smtClean="0"/>
-              <a:t>2024/10/24</a:t>
+              <a:t>2025/2/24</a:t>
             </a:fld>
             <a:endParaRPr lang="zh-CN" altLang="en-US"/>
           </a:p>
@@ -3467,7 +3467,7 @@
           <a:p>
             <a:fld id="{82F288E0-7875-42C4-84C8-98DBBD3BF4D2}" type="datetimeFigureOut">
               <a:rPr lang="zh-CN" altLang="en-US" smtClean="0"/>
-              <a:t>2024/10/24</a:t>
+              <a:t>2025/2/24</a:t>
             </a:fld>
             <a:endParaRPr lang="zh-CN" altLang="en-US"/>
           </a:p>
@@ -3722,7 +3722,7 @@
           <a:p>
             <a:fld id="{82F288E0-7875-42C4-84C8-98DBBD3BF4D2}" type="datetimeFigureOut">
               <a:rPr lang="zh-CN" altLang="en-US" smtClean="0"/>
-              <a:t>2024/10/24</a:t>
+              <a:t>2025/2/24</a:t>
             </a:fld>
             <a:endParaRPr lang="zh-CN" altLang="en-US"/>
           </a:p>
@@ -3903,7 +3903,7 @@
           <a:p>
             <a:fld id="{82F288E0-7875-42C4-84C8-98DBBD3BF4D2}" type="datetimeFigureOut">
               <a:rPr lang="zh-CN" altLang="en-US" smtClean="0"/>
-              <a:t>2024/10/24</a:t>
+              <a:t>2025/2/24</a:t>
             </a:fld>
             <a:endParaRPr lang="zh-CN" altLang="en-US"/>
           </a:p>
@@ -4122,7 +4122,7 @@
           <a:p>
             <a:fld id="{82F288E0-7875-42C4-84C8-98DBBD3BF4D2}" type="datetimeFigureOut">
               <a:rPr lang="zh-CN" altLang="en-US" smtClean="0"/>
-              <a:t>2024/10/24</a:t>
+              <a:t>2025/2/24</a:t>
             </a:fld>
             <a:endParaRPr lang="zh-CN" altLang="en-US"/>
           </a:p>

</xml_diff>